<commit_message>
updating with new practice exercises
</commit_message>
<xml_diff>
--- a/1_tokenization_cleaning/text_analysis_1.pptx
+++ b/1_tokenization_cleaning/text_analysis_1.pptx
@@ -144,7 +144,7 @@
 <file path=ppt/revisionInfo.xml><?xml version="1.0" encoding="utf-8"?>
 <p1510:revInfo xmlns:a="http://schemas.openxmlformats.org/drawingml/2006/main" xmlns:r="http://schemas.openxmlformats.org/officeDocument/2006/relationships" xmlns:p1510="http://schemas.microsoft.com/office/powerpoint/2015/10/main">
   <p1510:revLst>
-    <p1510:client id="{3A790A9C-5323-4C45-9A32-E2032788DABC}" v="62" dt="2025-10-27T03:46:20.416"/>
+    <p1510:client id="{3A790A9C-5323-4C45-9A32-E2032788DABC}" v="63" dt="2025-10-27T16:30:43.104"/>
   </p1510:revLst>
 </p1510:revInfo>
 </file>
@@ -154,12 +154,12 @@
   <pc:docChgLst>
     <pc:chgData name="Carroll, Claudia" userId="5513adb2-3315-47c6-853b-61e74126e783" providerId="ADAL" clId="{FDB037B5-BC6E-529D-920A-0733451977A9}"/>
     <pc:docChg chg="undo custSel addSld delSld modSld sldOrd">
-      <pc:chgData name="Carroll, Claudia" userId="5513adb2-3315-47c6-853b-61e74126e783" providerId="ADAL" clId="{FDB037B5-BC6E-529D-920A-0733451977A9}" dt="2025-10-27T03:46:43.650" v="2214" actId="5793"/>
+      <pc:chgData name="Carroll, Claudia" userId="5513adb2-3315-47c6-853b-61e74126e783" providerId="ADAL" clId="{FDB037B5-BC6E-529D-920A-0733451977A9}" dt="2025-10-27T16:30:43.101" v="2215" actId="767"/>
       <pc:docMkLst>
         <pc:docMk/>
       </pc:docMkLst>
       <pc:sldChg chg="addSp delSp modSp mod">
-        <pc:chgData name="Carroll, Claudia" userId="5513adb2-3315-47c6-853b-61e74126e783" providerId="ADAL" clId="{FDB037B5-BC6E-529D-920A-0733451977A9}" dt="2025-10-27T02:37:45.730" v="24"/>
+        <pc:chgData name="Carroll, Claudia" userId="5513adb2-3315-47c6-853b-61e74126e783" providerId="ADAL" clId="{FDB037B5-BC6E-529D-920A-0733451977A9}" dt="2025-10-27T16:30:43.101" v="2215" actId="767"/>
         <pc:sldMkLst>
           <pc:docMk/>
           <pc:sldMk cId="109857222" sldId="256"/>
@@ -178,6 +178,14 @@
             <pc:docMk/>
             <pc:sldMk cId="109857222" sldId="256"/>
             <ac:spMk id="4" creationId="{A01B8D1A-DEA9-4AC3-F5A0-1A450717BA09}"/>
+          </ac:spMkLst>
+        </pc:spChg>
+        <pc:spChg chg="add mod">
+          <ac:chgData name="Carroll, Claudia" userId="5513adb2-3315-47c6-853b-61e74126e783" providerId="ADAL" clId="{FDB037B5-BC6E-529D-920A-0733451977A9}" dt="2025-10-27T16:30:43.101" v="2215" actId="767"/>
+          <ac:spMkLst>
+            <pc:docMk/>
+            <pc:sldMk cId="109857222" sldId="256"/>
+            <ac:spMk id="4" creationId="{D395197F-1510-AF72-D673-0BE4402A3239}"/>
           </ac:spMkLst>
         </pc:spChg>
       </pc:sldChg>
@@ -3434,6 +3442,38 @@
           </a:p>
         </p:txBody>
       </p:sp>
+      <p:sp>
+        <p:nvSpPr>
+          <p:cNvPr id="4" name="TextBox 3">
+            <a:extLst>
+              <a:ext uri="{FF2B5EF4-FFF2-40B4-BE49-F238E27FC236}">
+                <a16:creationId xmlns:a16="http://schemas.microsoft.com/office/drawing/2014/main" id="{D395197F-1510-AF72-D673-0BE4402A3239}"/>
+              </a:ext>
+            </a:extLst>
+          </p:cNvPr>
+          <p:cNvSpPr txBox="1"/>
+          <p:nvPr/>
+        </p:nvSpPr>
+        <p:spPr>
+          <a:xfrm>
+            <a:off x="-1489166" y="914400"/>
+            <a:ext cx="184731" cy="369332"/>
+          </a:xfrm>
+          <a:prstGeom prst="rect">
+            <a:avLst/>
+          </a:prstGeom>
+          <a:noFill/>
+        </p:spPr>
+        <p:txBody>
+          <a:bodyPr wrap="none" rtlCol="0">
+            <a:spAutoFit/>
+          </a:bodyPr>
+          <a:lstStyle/>
+          <a:p>
+            <a:endParaRPr lang="en-US" dirty="0"/>
+          </a:p>
+        </p:txBody>
+      </p:sp>
     </p:spTree>
     <p:extLst>
       <p:ext uri="{BB962C8B-B14F-4D97-AF65-F5344CB8AC3E}">

</xml_diff>